<commit_message>
updated Day 5 training materials
</commit_message>
<xml_diff>
--- a/Day 4/Slides/8. Working with Enums/working-with-enums-slides.pptx
+++ b/Day 4/Slides/8. Working with Enums/working-with-enums-slides.pptx
@@ -5,29 +5,29 @@
     <p:sldMasterId id="2147483648" r:id="rId1"/>
   </p:sldMasterIdLst>
   <p:notesMasterIdLst>
-    <p:notesMasterId r:id="rId23"/>
+    <p:notesMasterId r:id="rId22"/>
   </p:notesMasterIdLst>
   <p:sldIdLst>
-    <p:sldId id="256" r:id="rId3"/>
-    <p:sldId id="257" r:id="rId4"/>
-    <p:sldId id="258" r:id="rId5"/>
-    <p:sldId id="259" r:id="rId6"/>
-    <p:sldId id="260" r:id="rId7"/>
-    <p:sldId id="261" r:id="rId8"/>
-    <p:sldId id="262" r:id="rId9"/>
-    <p:sldId id="263" r:id="rId10"/>
-    <p:sldId id="264" r:id="rId11"/>
-    <p:sldId id="265" r:id="rId12"/>
-    <p:sldId id="266" r:id="rId13"/>
-    <p:sldId id="267" r:id="rId14"/>
-    <p:sldId id="268" r:id="rId15"/>
-    <p:sldId id="269" r:id="rId16"/>
-    <p:sldId id="270" r:id="rId17"/>
-    <p:sldId id="271" r:id="rId18"/>
-    <p:sldId id="272" r:id="rId19"/>
-    <p:sldId id="273" r:id="rId20"/>
-    <p:sldId id="274" r:id="rId21"/>
-    <p:sldId id="275" r:id="rId22"/>
+    <p:sldId id="256" r:id="rId2"/>
+    <p:sldId id="257" r:id="rId3"/>
+    <p:sldId id="258" r:id="rId4"/>
+    <p:sldId id="259" r:id="rId5"/>
+    <p:sldId id="260" r:id="rId6"/>
+    <p:sldId id="261" r:id="rId7"/>
+    <p:sldId id="262" r:id="rId8"/>
+    <p:sldId id="263" r:id="rId9"/>
+    <p:sldId id="264" r:id="rId10"/>
+    <p:sldId id="265" r:id="rId11"/>
+    <p:sldId id="266" r:id="rId12"/>
+    <p:sldId id="267" r:id="rId13"/>
+    <p:sldId id="268" r:id="rId14"/>
+    <p:sldId id="269" r:id="rId15"/>
+    <p:sldId id="270" r:id="rId16"/>
+    <p:sldId id="271" r:id="rId17"/>
+    <p:sldId id="272" r:id="rId18"/>
+    <p:sldId id="273" r:id="rId19"/>
+    <p:sldId id="274" r:id="rId20"/>
+    <p:sldId id="275" r:id="rId21"/>
   </p:sldIdLst>
   <p:sldSz cx="12192000" cy="6858000"/>
   <p:notesSz cx="12192000" cy="6858000"/>
@@ -123,6 +123,22 @@
       </a:defRPr>
     </a:lvl9pPr>
   </p:defaultTextStyle>
+  <p:extLst>
+    <p:ext uri="{EFAFB233-063F-42B5-8137-9DF3F51BA10A}">
+      <p15:sldGuideLst xmlns:p15="http://schemas.microsoft.com/office/powerpoint/2012/main">
+        <p15:guide id="1" orient="horz" pos="2880">
+          <p15:clr>
+            <a:srgbClr val="A4A3A4"/>
+          </p15:clr>
+        </p15:guide>
+        <p15:guide id="2" pos="2160">
+          <p15:clr>
+            <a:srgbClr val="A4A3A4"/>
+          </p15:clr>
+        </p15:guide>
+      </p15:sldGuideLst>
+    </p:ext>
+  </p:extLst>
 </p:presentation>
 </file>
 
@@ -208,6 +224,7 @@
           <a:p>
             <a:fld id="{3EFD42F7-718C-4B98-AAEC-167E6DDD60A7}" type="datetimeFigureOut">
               <a:rPr lang="en-US" smtClean="0"/>
+              <a:t>8/9/2023</a:t>
             </a:fld>
             <a:endParaRPr lang="en-US"/>
           </a:p>
@@ -271,42 +288,37 @@
           <a:p>
             <a:pPr lvl="0"/>
             <a:r>
-              <a:rPr lang="en-US" smtClean="0"/>
+              <a:rPr lang="en-US"/>
               <a:t>Click to edit Master text styles</a:t>
             </a:r>
-            <a:endParaRPr lang="en-US" smtClean="0"/>
           </a:p>
           <a:p>
             <a:pPr lvl="1"/>
             <a:r>
-              <a:rPr lang="en-US" smtClean="0"/>
+              <a:rPr lang="en-US"/>
               <a:t>Second level</a:t>
             </a:r>
-            <a:endParaRPr lang="en-US" smtClean="0"/>
           </a:p>
           <a:p>
             <a:pPr lvl="2"/>
             <a:r>
-              <a:rPr lang="en-US" smtClean="0"/>
+              <a:rPr lang="en-US"/>
               <a:t>Third level</a:t>
             </a:r>
-            <a:endParaRPr lang="en-US" smtClean="0"/>
           </a:p>
           <a:p>
             <a:pPr lvl="3"/>
             <a:r>
-              <a:rPr lang="en-US" smtClean="0"/>
+              <a:rPr lang="en-US"/>
               <a:t>Fourth level</a:t>
             </a:r>
-            <a:endParaRPr lang="en-US" smtClean="0"/>
           </a:p>
           <a:p>
             <a:pPr lvl="4"/>
             <a:r>
-              <a:rPr lang="en-US" smtClean="0"/>
+              <a:rPr lang="en-US"/>
               <a:t>Fifth level</a:t>
             </a:r>
-            <a:endParaRPr lang="en-US"/>
           </a:p>
         </p:txBody>
       </p:sp>
@@ -370,6 +382,7 @@
           <a:p>
             <a:fld id="{21B2AA4F-B828-4D7C-AFD3-893933DAFCB4}" type="slidenum">
               <a:rPr lang="en-US" smtClean="0"/>
+              <a:t>‹#›</a:t>
             </a:fld>
             <a:endParaRPr lang="en-US"/>
           </a:p>
@@ -474,7 +487,7 @@
 </file>
 
 <file path=ppt/slideLayouts/slideLayout1.xml><?xml version="1.0" encoding="utf-8"?>
-<p:sldLayout xmlns:a="http://schemas.openxmlformats.org/drawingml/2006/main" xmlns:r="http://schemas.openxmlformats.org/officeDocument/2006/relationships" xmlns:p="http://schemas.openxmlformats.org/presentationml/2006/main" type="obj" preserve="1" showMasterSp="0">
+<p:sldLayout xmlns:a="http://schemas.openxmlformats.org/drawingml/2006/main" xmlns:r="http://schemas.openxmlformats.org/officeDocument/2006/relationships" xmlns:p="http://schemas.openxmlformats.org/presentationml/2006/main" showMasterSp="0" type="obj" preserve="1">
   <p:cSld name="Title Slide">
     <p:bg>
       <p:bgPr>
@@ -554,7 +567,9 @@
               </a:defRPr>
             </a:lvl1pPr>
           </a:lstStyle>
-          <a:p/>
+          <a:p>
+            <a:endParaRPr/>
+          </a:p>
         </p:txBody>
       </p:sp>
       <p:sp>
@@ -585,7 +600,9 @@
               <a:defRPr/>
             </a:lvl1pPr>
           </a:lstStyle>
-          <a:p/>
+          <a:p>
+            <a:endParaRPr/>
+          </a:p>
         </p:txBody>
       </p:sp>
       <p:sp>
@@ -612,7 +629,9 @@
               </a:defRPr>
             </a:lvl1pPr>
           </a:lstStyle>
-          <a:p/>
+          <a:p>
+            <a:endParaRPr/>
+          </a:p>
         </p:txBody>
       </p:sp>
       <p:sp>
@@ -642,6 +661,7 @@
           <a:p>
             <a:fld id="{1D8BD707-D9CF-40AE-B4C6-C98DA3205C09}" type="datetimeFigureOut">
               <a:rPr lang="en-US"/>
+              <a:t>8/9/2023</a:t>
             </a:fld>
             <a:endParaRPr lang="en-US"/>
           </a:p>
@@ -674,6 +694,7 @@
           <a:p>
             <a:fld id="{B6F15528-21DE-4FAA-801E-634DDDAF4B2B}" type="slidenum">
               <a:rPr/>
+              <a:t>‹#›</a:t>
             </a:fld>
             <a:endParaRPr/>
           </a:p>
@@ -689,7 +710,7 @@
 </file>
 
 <file path=ppt/slideLayouts/slideLayout2.xml><?xml version="1.0" encoding="utf-8"?>
-<p:sldLayout xmlns:a="http://schemas.openxmlformats.org/drawingml/2006/main" xmlns:r="http://schemas.openxmlformats.org/officeDocument/2006/relationships" xmlns:p="http://schemas.openxmlformats.org/presentationml/2006/main" type="obj" preserve="1" showMasterSp="0">
+<p:sldLayout xmlns:a="http://schemas.openxmlformats.org/drawingml/2006/main" xmlns:r="http://schemas.openxmlformats.org/officeDocument/2006/relationships" xmlns:p="http://schemas.openxmlformats.org/presentationml/2006/main" showMasterSp="0" type="obj" preserve="1">
   <p:cSld name="Title and Content">
     <p:bg>
       <p:bgPr>
@@ -758,7 +779,9 @@
         <p:txBody>
           <a:bodyPr wrap="square" lIns="0" tIns="0" rIns="0" bIns="0" rtlCol="0"/>
           <a:lstStyle/>
-          <a:p/>
+          <a:p>
+            <a:endParaRPr/>
+          </a:p>
         </p:txBody>
       </p:sp>
       <p:pic>
@@ -840,7 +863,9 @@
         <p:txBody>
           <a:bodyPr wrap="square" lIns="0" tIns="0" rIns="0" bIns="0" rtlCol="0"/>
           <a:lstStyle/>
-          <a:p/>
+          <a:p>
+            <a:endParaRPr/>
+          </a:p>
         </p:txBody>
       </p:sp>
       <p:sp>
@@ -867,7 +892,9 @@
               </a:defRPr>
             </a:lvl1pPr>
           </a:lstStyle>
-          <a:p/>
+          <a:p>
+            <a:endParaRPr/>
+          </a:p>
         </p:txBody>
       </p:sp>
       <p:sp>
@@ -892,7 +919,9 @@
               </a:defRPr>
             </a:lvl1pPr>
           </a:lstStyle>
-          <a:p/>
+          <a:p>
+            <a:endParaRPr/>
+          </a:p>
         </p:txBody>
       </p:sp>
       <p:sp>
@@ -919,7 +948,9 @@
               </a:defRPr>
             </a:lvl1pPr>
           </a:lstStyle>
-          <a:p/>
+          <a:p>
+            <a:endParaRPr/>
+          </a:p>
         </p:txBody>
       </p:sp>
       <p:sp>
@@ -949,6 +980,7 @@
           <a:p>
             <a:fld id="{1D8BD707-D9CF-40AE-B4C6-C98DA3205C09}" type="datetimeFigureOut">
               <a:rPr lang="en-US"/>
+              <a:t>8/9/2023</a:t>
             </a:fld>
             <a:endParaRPr lang="en-US"/>
           </a:p>
@@ -981,6 +1013,7 @@
           <a:p>
             <a:fld id="{B6F15528-21DE-4FAA-801E-634DDDAF4B2B}" type="slidenum">
               <a:rPr/>
+              <a:t>‹#›</a:t>
             </a:fld>
             <a:endParaRPr/>
           </a:p>
@@ -996,7 +1029,7 @@
 </file>
 
 <file path=ppt/slideLayouts/slideLayout3.xml><?xml version="1.0" encoding="utf-8"?>
-<p:sldLayout xmlns:a="http://schemas.openxmlformats.org/drawingml/2006/main" xmlns:r="http://schemas.openxmlformats.org/officeDocument/2006/relationships" xmlns:p="http://schemas.openxmlformats.org/presentationml/2006/main" type="obj" preserve="1" showMasterSp="0">
+<p:sldLayout xmlns:a="http://schemas.openxmlformats.org/drawingml/2006/main" xmlns:r="http://schemas.openxmlformats.org/officeDocument/2006/relationships" xmlns:p="http://schemas.openxmlformats.org/presentationml/2006/main" showMasterSp="0" type="obj" preserve="1">
   <p:cSld name="Two Content">
     <p:bg>
       <p:bgPr>
@@ -1065,7 +1098,9 @@
         <p:txBody>
           <a:bodyPr wrap="square" lIns="0" tIns="0" rIns="0" bIns="0" rtlCol="0"/>
           <a:lstStyle/>
-          <a:p/>
+          <a:p>
+            <a:endParaRPr/>
+          </a:p>
         </p:txBody>
       </p:sp>
       <p:pic>
@@ -1147,7 +1182,9 @@
         <p:txBody>
           <a:bodyPr wrap="square" lIns="0" tIns="0" rIns="0" bIns="0" rtlCol="0"/>
           <a:lstStyle/>
-          <a:p/>
+          <a:p>
+            <a:endParaRPr/>
+          </a:p>
         </p:txBody>
       </p:sp>
       <p:sp>
@@ -1207,7 +1244,9 @@
         <p:txBody>
           <a:bodyPr wrap="square" lIns="0" tIns="0" rIns="0" bIns="0" rtlCol="0"/>
           <a:lstStyle/>
-          <a:p/>
+          <a:p>
+            <a:endParaRPr/>
+          </a:p>
         </p:txBody>
       </p:sp>
       <p:sp>
@@ -1234,7 +1273,9 @@
               </a:defRPr>
             </a:lvl1pPr>
           </a:lstStyle>
-          <a:p/>
+          <a:p>
+            <a:endParaRPr/>
+          </a:p>
         </p:txBody>
       </p:sp>
       <p:sp>
@@ -1265,7 +1306,9 @@
               <a:defRPr/>
             </a:lvl1pPr>
           </a:lstStyle>
-          <a:p/>
+          <a:p>
+            <a:endParaRPr/>
+          </a:p>
         </p:txBody>
       </p:sp>
       <p:sp>
@@ -1302,7 +1345,9 @@
               </a:defRPr>
             </a:lvl1pPr>
           </a:lstStyle>
-          <a:p/>
+          <a:p>
+            <a:endParaRPr/>
+          </a:p>
         </p:txBody>
       </p:sp>
       <p:sp>
@@ -1329,7 +1374,9 @@
               </a:defRPr>
             </a:lvl1pPr>
           </a:lstStyle>
-          <a:p/>
+          <a:p>
+            <a:endParaRPr/>
+          </a:p>
         </p:txBody>
       </p:sp>
       <p:sp>
@@ -1359,6 +1406,7 @@
           <a:p>
             <a:fld id="{1D8BD707-D9CF-40AE-B4C6-C98DA3205C09}" type="datetimeFigureOut">
               <a:rPr lang="en-US"/>
+              <a:t>8/9/2023</a:t>
             </a:fld>
             <a:endParaRPr lang="en-US"/>
           </a:p>
@@ -1391,6 +1439,7 @@
           <a:p>
             <a:fld id="{B6F15528-21DE-4FAA-801E-634DDDAF4B2B}" type="slidenum">
               <a:rPr/>
+              <a:t>‹#›</a:t>
             </a:fld>
             <a:endParaRPr/>
           </a:p>
@@ -1446,7 +1495,9 @@
               </a:defRPr>
             </a:lvl1pPr>
           </a:lstStyle>
-          <a:p/>
+          <a:p>
+            <a:endParaRPr/>
+          </a:p>
         </p:txBody>
       </p:sp>
       <p:sp>
@@ -1473,7 +1524,9 @@
               </a:defRPr>
             </a:lvl1pPr>
           </a:lstStyle>
-          <a:p/>
+          <a:p>
+            <a:endParaRPr/>
+          </a:p>
         </p:txBody>
       </p:sp>
       <p:sp>
@@ -1503,6 +1556,7 @@
           <a:p>
             <a:fld id="{1D8BD707-D9CF-40AE-B4C6-C98DA3205C09}" type="datetimeFigureOut">
               <a:rPr lang="en-US"/>
+              <a:t>8/9/2023</a:t>
             </a:fld>
             <a:endParaRPr lang="en-US"/>
           </a:p>
@@ -1535,6 +1589,7 @@
           <a:p>
             <a:fld id="{B6F15528-21DE-4FAA-801E-634DDDAF4B2B}" type="slidenum">
               <a:rPr/>
+              <a:t>‹#›</a:t>
             </a:fld>
             <a:endParaRPr/>
           </a:p>
@@ -1550,7 +1605,7 @@
 </file>
 
 <file path=ppt/slideLayouts/slideLayout5.xml><?xml version="1.0" encoding="utf-8"?>
-<p:sldLayout xmlns:a="http://schemas.openxmlformats.org/drawingml/2006/main" xmlns:r="http://schemas.openxmlformats.org/officeDocument/2006/relationships" xmlns:p="http://schemas.openxmlformats.org/presentationml/2006/main" type="obj" preserve="1" showMasterSp="0">
+<p:sldLayout xmlns:a="http://schemas.openxmlformats.org/drawingml/2006/main" xmlns:r="http://schemas.openxmlformats.org/officeDocument/2006/relationships" xmlns:p="http://schemas.openxmlformats.org/presentationml/2006/main" showMasterSp="0" type="obj" preserve="1">
   <p:cSld name="Blank">
     <p:bg>
       <p:bgPr>
@@ -1619,7 +1674,9 @@
         <p:txBody>
           <a:bodyPr wrap="square" lIns="0" tIns="0" rIns="0" bIns="0" rtlCol="0"/>
           <a:lstStyle/>
-          <a:p/>
+          <a:p>
+            <a:endParaRPr/>
+          </a:p>
         </p:txBody>
       </p:sp>
       <p:sp>
@@ -1646,7 +1703,9 @@
               </a:defRPr>
             </a:lvl1pPr>
           </a:lstStyle>
-          <a:p/>
+          <a:p>
+            <a:endParaRPr/>
+          </a:p>
         </p:txBody>
       </p:sp>
       <p:sp>
@@ -1676,6 +1735,7 @@
           <a:p>
             <a:fld id="{1D8BD707-D9CF-40AE-B4C6-C98DA3205C09}" type="datetimeFigureOut">
               <a:rPr lang="en-US"/>
+              <a:t>8/9/2023</a:t>
             </a:fld>
             <a:endParaRPr lang="en-US"/>
           </a:p>
@@ -1708,6 +1768,7 @@
           <a:p>
             <a:fld id="{B6F15528-21DE-4FAA-801E-634DDDAF4B2B}" type="slidenum">
               <a:rPr/>
+              <a:t>‹#›</a:t>
             </a:fld>
             <a:endParaRPr/>
           </a:p>
@@ -1781,7 +1842,9 @@
               </a:defRPr>
             </a:lvl1pPr>
           </a:lstStyle>
-          <a:p/>
+          <a:p>
+            <a:endParaRPr/>
+          </a:p>
         </p:txBody>
       </p:sp>
       <p:sp>
@@ -1816,7 +1879,9 @@
               </a:defRPr>
             </a:lvl1pPr>
           </a:lstStyle>
-          <a:p/>
+          <a:p>
+            <a:endParaRPr/>
+          </a:p>
         </p:txBody>
       </p:sp>
       <p:sp>
@@ -1853,7 +1918,9 @@
               </a:defRPr>
             </a:lvl1pPr>
           </a:lstStyle>
-          <a:p/>
+          <a:p>
+            <a:endParaRPr/>
+          </a:p>
         </p:txBody>
       </p:sp>
       <p:sp>
@@ -1893,6 +1960,7 @@
           <a:p>
             <a:fld id="{1D8BD707-D9CF-40AE-B4C6-C98DA3205C09}" type="datetimeFigureOut">
               <a:rPr lang="en-US"/>
+              <a:t>8/9/2023</a:t>
             </a:fld>
             <a:endParaRPr lang="en-US"/>
           </a:p>
@@ -1935,6 +2003,7 @@
           <a:p>
             <a:fld id="{B6F15528-21DE-4FAA-801E-634DDDAF4B2B}" type="slidenum">
               <a:rPr/>
+              <a:t>‹#›</a:t>
             </a:fld>
             <a:endParaRPr/>
           </a:p>
@@ -2158,7 +2227,9 @@
           <p:txBody>
             <a:bodyPr wrap="square" lIns="0" tIns="0" rIns="0" bIns="0" rtlCol="0"/>
             <a:lstStyle/>
-            <a:p/>
+            <a:p>
+              <a:endParaRPr/>
+            </a:p>
           </p:txBody>
         </p:sp>
         <p:pic>
@@ -2168,7 +2239,7 @@
             <p:nvPr/>
           </p:nvPicPr>
           <p:blipFill>
-            <a:blip r:embed="rId1" cstate="print"/>
+            <a:blip r:embed="rId2" cstate="print"/>
             <a:stretch>
               <a:fillRect/>
             </a:stretch>
@@ -2303,15 +2374,7 @@
                   <a:srgbClr val="171717"/>
                 </a:solidFill>
               </a:rPr>
-              <a:t>t</a:t>
-            </a:r>
-            <a:r>
-              <a:rPr sz="4500" spc="-80" dirty="0">
-                <a:solidFill>
-                  <a:srgbClr val="171717"/>
-                </a:solidFill>
-              </a:rPr>
-              <a:t>h</a:t>
+              <a:t>th</a:t>
             </a:r>
             <a:r>
               <a:rPr sz="4500" spc="-459" dirty="0">
@@ -2370,9 +2433,11 @@
         <p:spPr/>
         <p:txBody>
           <a:bodyPr/>
+          <a:lstStyle/>
           <a:p>
             <a:fld id="{B6F15528-21DE-4FAA-801E-634DDDAF4B2B}" type="slidenum">
               <a:rPr/>
+              <a:t>1</a:t>
             </a:fld>
             <a:endParaRPr/>
           </a:p>
@@ -2448,7 +2513,9 @@
         <p:txBody>
           <a:bodyPr wrap="square" lIns="0" tIns="0" rIns="0" bIns="0" rtlCol="0"/>
           <a:lstStyle/>
-          <a:p/>
+          <a:p>
+            <a:endParaRPr/>
+          </a:p>
         </p:txBody>
       </p:sp>
       <p:sp>
@@ -2496,7 +2563,9 @@
         <p:txBody>
           <a:bodyPr wrap="square" lIns="0" tIns="0" rIns="0" bIns="0" rtlCol="0"/>
           <a:lstStyle/>
-          <a:p/>
+          <a:p>
+            <a:endParaRPr/>
+          </a:p>
         </p:txBody>
       </p:sp>
       <p:sp>
@@ -2544,7 +2613,9 @@
         <p:txBody>
           <a:bodyPr wrap="square" lIns="0" tIns="0" rIns="0" bIns="0" rtlCol="0"/>
           <a:lstStyle/>
-          <a:p/>
+          <a:p>
+            <a:endParaRPr/>
+          </a:p>
         </p:txBody>
       </p:sp>
       <p:sp>
@@ -2647,7 +2718,7 @@
           <p:nvPr/>
         </p:nvPicPr>
         <p:blipFill>
-          <a:blip r:embed="rId1" cstate="print"/>
+          <a:blip r:embed="rId2" cstate="print"/>
           <a:stretch>
             <a:fillRect/>
           </a:stretch>
@@ -2815,7 +2886,7 @@
           <p:nvPr/>
         </p:nvPicPr>
         <p:blipFill>
-          <a:blip r:embed="rId2" cstate="print"/>
+          <a:blip r:embed="rId3" cstate="print"/>
           <a:stretch>
             <a:fillRect/>
           </a:stretch>
@@ -3003,7 +3074,7 @@
           <p:nvPr/>
         </p:nvPicPr>
         <p:blipFill>
-          <a:blip r:embed="rId3" cstate="print"/>
+          <a:blip r:embed="rId4" cstate="print"/>
           <a:stretch>
             <a:fillRect/>
           </a:stretch>
@@ -3137,9 +3208,11 @@
         <p:spPr/>
         <p:txBody>
           <a:bodyPr/>
+          <a:lstStyle/>
           <a:p>
             <a:fld id="{B6F15528-21DE-4FAA-801E-634DDDAF4B2B}" type="slidenum">
               <a:rPr/>
+              <a:t>10</a:t>
             </a:fld>
             <a:endParaRPr/>
           </a:p>
@@ -3177,7 +3250,7 @@
           <p:nvPr/>
         </p:nvPicPr>
         <p:blipFill>
-          <a:blip r:embed="rId1" cstate="print"/>
+          <a:blip r:embed="rId2" cstate="print"/>
           <a:stretch>
             <a:fillRect/>
           </a:stretch>
@@ -3199,7 +3272,7 @@
           <p:nvPr/>
         </p:nvPicPr>
         <p:blipFill>
-          <a:blip r:embed="rId2" cstate="print"/>
+          <a:blip r:embed="rId3" cstate="print"/>
           <a:stretch>
             <a:fillRect/>
           </a:stretch>
@@ -3221,7 +3294,7 @@
           <p:nvPr/>
         </p:nvPicPr>
         <p:blipFill>
-          <a:blip r:embed="rId3" cstate="print"/>
+          <a:blip r:embed="rId4" cstate="print"/>
           <a:stretch>
             <a:fillRect/>
           </a:stretch>
@@ -3596,9 +3669,11 @@
         <p:spPr/>
         <p:txBody>
           <a:bodyPr/>
+          <a:lstStyle/>
           <a:p>
             <a:fld id="{B6F15528-21DE-4FAA-801E-634DDDAF4B2B}" type="slidenum">
               <a:rPr/>
+              <a:t>11</a:t>
             </a:fld>
             <a:endParaRPr/>
           </a:p>
@@ -4195,7 +4270,7 @@
           <p:nvPr/>
         </p:nvPicPr>
         <p:blipFill>
-          <a:blip r:embed="rId1" cstate="print"/>
+          <a:blip r:embed="rId2" cstate="print"/>
           <a:stretch>
             <a:fillRect/>
           </a:stretch>
@@ -4217,7 +4292,7 @@
           <p:nvPr/>
         </p:nvPicPr>
         <p:blipFill>
-          <a:blip r:embed="rId2" cstate="print"/>
+          <a:blip r:embed="rId3" cstate="print"/>
           <a:stretch>
             <a:fillRect/>
           </a:stretch>
@@ -4239,7 +4314,7 @@
           <p:nvPr/>
         </p:nvPicPr>
         <p:blipFill>
-          <a:blip r:embed="rId3" cstate="print"/>
+          <a:blip r:embed="rId4" cstate="print"/>
           <a:stretch>
             <a:fillRect/>
           </a:stretch>
@@ -4261,7 +4336,7 @@
           <p:nvPr/>
         </p:nvPicPr>
         <p:blipFill>
-          <a:blip r:embed="rId4" cstate="print"/>
+          <a:blip r:embed="rId5" cstate="print"/>
           <a:stretch>
             <a:fillRect/>
           </a:stretch>
@@ -4289,9 +4364,11 @@
         <p:spPr/>
         <p:txBody>
           <a:bodyPr/>
+          <a:lstStyle/>
           <a:p>
             <a:fld id="{B6F15528-21DE-4FAA-801E-634DDDAF4B2B}" type="slidenum">
               <a:rPr/>
+              <a:t>12</a:t>
             </a:fld>
             <a:endParaRPr/>
           </a:p>
@@ -4444,17 +4521,7 @@
                 <a:latin typeface="Courier New" panose="02070309020205020404"/>
                 <a:cs typeface="Courier New" panose="02070309020205020404"/>
               </a:rPr>
-              <a:t>FLIGHT_ATTENDANT,  </a:t>
-            </a:r>
-            <a:r>
-              <a:rPr sz="2000" spc="-5" dirty="0">
-                <a:solidFill>
-                  <a:srgbClr val="F2F2F2"/>
-                </a:solidFill>
-                <a:latin typeface="Courier New" panose="02070309020205020404"/>
-                <a:cs typeface="Courier New" panose="02070309020205020404"/>
-              </a:rPr>
-              <a:t>COPILOT,</a:t>
+              <a:t>FLIGHT_ATTENDANT,  COPILOT,</a:t>
             </a:r>
             <a:endParaRPr sz="2000">
               <a:latin typeface="Courier New" panose="02070309020205020404"/>
@@ -4940,7 +5007,9 @@
         <p:txBody>
           <a:bodyPr wrap="square" lIns="0" tIns="0" rIns="0" bIns="0" rtlCol="0"/>
           <a:lstStyle/>
-          <a:p/>
+          <a:p>
+            <a:endParaRPr/>
+          </a:p>
         </p:txBody>
       </p:sp>
       <p:sp>
@@ -4956,9 +5025,11 @@
         <p:spPr/>
         <p:txBody>
           <a:bodyPr/>
+          <a:lstStyle/>
           <a:p>
             <a:fld id="{B6F15528-21DE-4FAA-801E-634DDDAF4B2B}" type="slidenum">
               <a:rPr/>
+              <a:t>13</a:t>
             </a:fld>
             <a:endParaRPr/>
           </a:p>
@@ -5111,17 +5182,7 @@
                 <a:latin typeface="Courier New" panose="02070309020205020404"/>
                 <a:cs typeface="Courier New" panose="02070309020205020404"/>
               </a:rPr>
-              <a:t>FLIGHT_ATTENDANT,  </a:t>
-            </a:r>
-            <a:r>
-              <a:rPr sz="2000" spc="-5" dirty="0">
-                <a:solidFill>
-                  <a:srgbClr val="F2F2F2"/>
-                </a:solidFill>
-                <a:latin typeface="Courier New" panose="02070309020205020404"/>
-                <a:cs typeface="Courier New" panose="02070309020205020404"/>
-              </a:rPr>
-              <a:t>COPILOT,</a:t>
+              <a:t>FLIGHT_ATTENDANT,  COPILOT,</a:t>
             </a:r>
             <a:endParaRPr sz="2000">
               <a:latin typeface="Courier New" panose="02070309020205020404"/>
@@ -5566,9 +5627,11 @@
         <p:spPr/>
         <p:txBody>
           <a:bodyPr/>
+          <a:lstStyle/>
           <a:p>
             <a:fld id="{B6F15528-21DE-4FAA-801E-634DDDAF4B2B}" type="slidenum">
               <a:rPr/>
+              <a:t>14</a:t>
             </a:fld>
             <a:endParaRPr/>
           </a:p>
@@ -6179,9 +6242,11 @@
         <p:spPr/>
         <p:txBody>
           <a:bodyPr/>
+          <a:lstStyle/>
           <a:p>
             <a:fld id="{B6F15528-21DE-4FAA-801E-634DDDAF4B2B}" type="slidenum">
               <a:rPr/>
+              <a:t>15</a:t>
             </a:fld>
             <a:endParaRPr/>
           </a:p>
@@ -6798,9 +6863,11 @@
         <p:spPr/>
         <p:txBody>
           <a:bodyPr/>
+          <a:lstStyle/>
           <a:p>
             <a:fld id="{B6F15528-21DE-4FAA-801E-634DDDAF4B2B}" type="slidenum">
               <a:rPr/>
+              <a:t>16</a:t>
             </a:fld>
             <a:endParaRPr/>
           </a:p>
@@ -7709,9 +7776,11 @@
         <p:spPr/>
         <p:txBody>
           <a:bodyPr/>
+          <a:lstStyle/>
           <a:p>
             <a:fld id="{B6F15528-21DE-4FAA-801E-634DDDAF4B2B}" type="slidenum">
               <a:rPr/>
+              <a:t>17</a:t>
             </a:fld>
             <a:endParaRPr/>
           </a:p>
@@ -8640,9 +8709,11 @@
         <p:spPr/>
         <p:txBody>
           <a:bodyPr/>
+          <a:lstStyle/>
           <a:p>
             <a:fld id="{B6F15528-21DE-4FAA-801E-634DDDAF4B2B}" type="slidenum">
               <a:rPr/>
+              <a:t>18</a:t>
             </a:fld>
             <a:endParaRPr/>
           </a:p>
@@ -8680,7 +8751,7 @@
           <p:nvPr/>
         </p:nvPicPr>
         <p:blipFill>
-          <a:blip r:embed="rId1" cstate="print"/>
+          <a:blip r:embed="rId2" cstate="print"/>
           <a:stretch>
             <a:fillRect/>
           </a:stretch>
@@ -8740,7 +8811,6 @@
               <a:rPr spc="20" dirty="0"/>
               <a:t>types</a:t>
             </a:r>
-            <a:endParaRPr spc="20" dirty="0"/>
           </a:p>
         </p:txBody>
       </p:sp>
@@ -9689,9 +9759,11 @@
         <p:spPr/>
         <p:txBody>
           <a:bodyPr/>
+          <a:lstStyle/>
           <a:p>
             <a:fld id="{B6F15528-21DE-4FAA-801E-634DDDAF4B2B}" type="slidenum">
               <a:rPr/>
+              <a:t>19</a:t>
             </a:fld>
             <a:endParaRPr/>
           </a:p>
@@ -9787,7 +9859,6 @@
               <a:rPr spc="20" dirty="0"/>
               <a:t>types</a:t>
             </a:r>
-            <a:endParaRPr spc="20" dirty="0"/>
           </a:p>
           <a:p>
             <a:pPr marL="3077210" marR="5080">
@@ -9886,7 +9957,6 @@
               <a:rPr spc="15" dirty="0"/>
               <a:t>methods</a:t>
             </a:r>
-            <a:endParaRPr spc="15" dirty="0"/>
           </a:p>
         </p:txBody>
       </p:sp>
@@ -10075,9 +10145,11 @@
         <p:spPr/>
         <p:txBody>
           <a:bodyPr/>
+          <a:lstStyle/>
           <a:p>
             <a:fld id="{B6F15528-21DE-4FAA-801E-634DDDAF4B2B}" type="slidenum">
               <a:rPr/>
+              <a:t>2</a:t>
             </a:fld>
             <a:endParaRPr/>
           </a:p>
@@ -10115,7 +10187,7 @@
           <p:nvPr/>
         </p:nvPicPr>
         <p:blipFill>
-          <a:blip r:embed="rId1" cstate="print"/>
+          <a:blip r:embed="rId2" cstate="print"/>
           <a:stretch>
             <a:fillRect/>
           </a:stretch>
@@ -10187,7 +10259,6 @@
               <a:rPr spc="-10" dirty="0"/>
               <a:t>classes</a:t>
             </a:r>
-            <a:endParaRPr spc="-10" dirty="0"/>
           </a:p>
         </p:txBody>
       </p:sp>
@@ -10853,9 +10924,11 @@
         <p:spPr/>
         <p:txBody>
           <a:bodyPr/>
+          <a:lstStyle/>
           <a:p>
             <a:fld id="{B6F15528-21DE-4FAA-801E-634DDDAF4B2B}" type="slidenum">
               <a:rPr/>
+              <a:t>20</a:t>
             </a:fld>
             <a:endParaRPr/>
           </a:p>
@@ -11790,9 +11863,11 @@
         <p:spPr/>
         <p:txBody>
           <a:bodyPr/>
+          <a:lstStyle/>
           <a:p>
             <a:fld id="{B6F15528-21DE-4FAA-801E-634DDDAF4B2B}" type="slidenum">
               <a:rPr/>
+              <a:t>3</a:t>
             </a:fld>
             <a:endParaRPr/>
           </a:p>
@@ -12643,157 +12718,137 @@
                 <a:latin typeface="Verdana" panose="020B0604030504040204"/>
                 <a:cs typeface="Verdana" panose="020B0604030504040204"/>
               </a:rPr>
+              <a:t>an</a:t>
+            </a:r>
+            <a:r>
+              <a:rPr sz="2200" spc="90" dirty="0">
+                <a:solidFill>
+                  <a:srgbClr val="404040"/>
+                </a:solidFill>
+                <a:latin typeface="Verdana" panose="020B0604030504040204"/>
+                <a:cs typeface="Verdana" panose="020B0604030504040204"/>
+              </a:rPr>
+              <a:t>d</a:t>
+            </a:r>
+            <a:r>
+              <a:rPr sz="2200" spc="-110" dirty="0">
+                <a:solidFill>
+                  <a:srgbClr val="404040"/>
+                </a:solidFill>
+                <a:latin typeface="Verdana" panose="020B0604030504040204"/>
+                <a:cs typeface="Verdana" panose="020B0604030504040204"/>
+              </a:rPr>
+              <a:t> </a:t>
+            </a:r>
+            <a:r>
+              <a:rPr sz="2200" spc="-270" dirty="0">
+                <a:solidFill>
+                  <a:srgbClr val="404040"/>
+                </a:solidFill>
+                <a:latin typeface="Verdana" panose="020B0604030504040204"/>
+                <a:cs typeface="Verdana" panose="020B0604030504040204"/>
+              </a:rPr>
+              <a:t>!</a:t>
+            </a:r>
+            <a:r>
+              <a:rPr sz="2200" spc="-430" dirty="0">
+                <a:solidFill>
+                  <a:srgbClr val="404040"/>
+                </a:solidFill>
+                <a:latin typeface="Verdana" panose="020B0604030504040204"/>
+                <a:cs typeface="Verdana" panose="020B0604030504040204"/>
+              </a:rPr>
+              <a:t>=</a:t>
+            </a:r>
+            <a:r>
+              <a:rPr sz="2200" spc="-114" dirty="0">
+                <a:solidFill>
+                  <a:srgbClr val="404040"/>
+                </a:solidFill>
+                <a:latin typeface="Verdana" panose="020B0604030504040204"/>
+                <a:cs typeface="Verdana" panose="020B0604030504040204"/>
+              </a:rPr>
+              <a:t> </a:t>
+            </a:r>
+            <a:r>
+              <a:rPr sz="2200" spc="85" dirty="0">
+                <a:solidFill>
+                  <a:srgbClr val="404040"/>
+                </a:solidFill>
+                <a:latin typeface="Verdana" panose="020B0604030504040204"/>
+                <a:cs typeface="Verdana" panose="020B0604030504040204"/>
+              </a:rPr>
+              <a:t>o</a:t>
+            </a:r>
+            <a:r>
+              <a:rPr sz="2200" spc="90" dirty="0">
+                <a:solidFill>
+                  <a:srgbClr val="404040"/>
+                </a:solidFill>
+                <a:latin typeface="Verdana" panose="020B0604030504040204"/>
+                <a:cs typeface="Verdana" panose="020B0604030504040204"/>
+              </a:rPr>
+              <a:t>p</a:t>
+            </a:r>
+            <a:r>
+              <a:rPr sz="2200" spc="-15" dirty="0">
+                <a:solidFill>
+                  <a:srgbClr val="404040"/>
+                </a:solidFill>
+                <a:latin typeface="Verdana" panose="020B0604030504040204"/>
+                <a:cs typeface="Verdana" panose="020B0604030504040204"/>
+              </a:rPr>
+              <a:t>e</a:t>
+            </a:r>
+            <a:r>
+              <a:rPr sz="2200" spc="-110" dirty="0">
+                <a:solidFill>
+                  <a:srgbClr val="404040"/>
+                </a:solidFill>
+                <a:latin typeface="Verdana" panose="020B0604030504040204"/>
+                <a:cs typeface="Verdana" panose="020B0604030504040204"/>
+              </a:rPr>
+              <a:t>r</a:t>
+            </a:r>
+            <a:r>
+              <a:rPr sz="2200" spc="-60" dirty="0">
+                <a:solidFill>
+                  <a:srgbClr val="404040"/>
+                </a:solidFill>
+                <a:latin typeface="Verdana" panose="020B0604030504040204"/>
+                <a:cs typeface="Verdana" panose="020B0604030504040204"/>
+              </a:rPr>
               <a:t>a</a:t>
             </a:r>
             <a:r>
-              <a:rPr sz="2200" spc="-50" dirty="0">
+              <a:rPr sz="2200" spc="-15" dirty="0">
                 <a:solidFill>
                   <a:srgbClr val="404040"/>
                 </a:solidFill>
                 <a:latin typeface="Verdana" panose="020B0604030504040204"/>
                 <a:cs typeface="Verdana" panose="020B0604030504040204"/>
               </a:rPr>
-              <a:t>n</a:t>
-            </a:r>
-            <a:r>
-              <a:rPr sz="2200" spc="90" dirty="0">
+              <a:t>t</a:t>
+            </a:r>
+            <a:r>
+              <a:rPr sz="2200" spc="85" dirty="0">
                 <a:solidFill>
                   <a:srgbClr val="404040"/>
                 </a:solidFill>
                 <a:latin typeface="Verdana" panose="020B0604030504040204"/>
                 <a:cs typeface="Verdana" panose="020B0604030504040204"/>
               </a:rPr>
-              <a:t>d</a:t>
-            </a:r>
-            <a:r>
-              <a:rPr sz="2200" spc="-110" dirty="0">
+              <a:t>o</a:t>
+            </a:r>
+            <a:r>
+              <a:rPr sz="2200" spc="-55" dirty="0">
                 <a:solidFill>
                   <a:srgbClr val="404040"/>
                 </a:solidFill>
                 <a:latin typeface="Verdana" panose="020B0604030504040204"/>
                 <a:cs typeface="Verdana" panose="020B0604030504040204"/>
               </a:rPr>
-              <a:t> </a:t>
-            </a:r>
-            <a:r>
-              <a:rPr sz="2200" spc="-270" dirty="0">
-                <a:solidFill>
-                  <a:srgbClr val="404040"/>
-                </a:solidFill>
-                <a:latin typeface="Verdana" panose="020B0604030504040204"/>
-                <a:cs typeface="Verdana" panose="020B0604030504040204"/>
-              </a:rPr>
-              <a:t>!</a:t>
-            </a:r>
-            <a:r>
-              <a:rPr sz="2200" spc="-430" dirty="0">
-                <a:solidFill>
-                  <a:srgbClr val="404040"/>
-                </a:solidFill>
-                <a:latin typeface="Verdana" panose="020B0604030504040204"/>
-                <a:cs typeface="Verdana" panose="020B0604030504040204"/>
-              </a:rPr>
-              <a:t>=</a:t>
-            </a:r>
-            <a:r>
-              <a:rPr sz="2200" spc="-114" dirty="0">
-                <a:solidFill>
-                  <a:srgbClr val="404040"/>
-                </a:solidFill>
-                <a:latin typeface="Verdana" panose="020B0604030504040204"/>
-                <a:cs typeface="Verdana" panose="020B0604030504040204"/>
-              </a:rPr>
-              <a:t> </a:t>
-            </a:r>
-            <a:r>
-              <a:rPr sz="2200" spc="85" dirty="0">
-                <a:solidFill>
-                  <a:srgbClr val="404040"/>
-                </a:solidFill>
-                <a:latin typeface="Verdana" panose="020B0604030504040204"/>
-                <a:cs typeface="Verdana" panose="020B0604030504040204"/>
-              </a:rPr>
-              <a:t>o</a:t>
-            </a:r>
-            <a:r>
-              <a:rPr sz="2200" spc="90" dirty="0">
-                <a:solidFill>
-                  <a:srgbClr val="404040"/>
-                </a:solidFill>
-                <a:latin typeface="Verdana" panose="020B0604030504040204"/>
-                <a:cs typeface="Verdana" panose="020B0604030504040204"/>
-              </a:rPr>
-              <a:t>p</a:t>
-            </a:r>
-            <a:r>
-              <a:rPr sz="2200" spc="-15" dirty="0">
-                <a:solidFill>
-                  <a:srgbClr val="404040"/>
-                </a:solidFill>
-                <a:latin typeface="Verdana" panose="020B0604030504040204"/>
-                <a:cs typeface="Verdana" panose="020B0604030504040204"/>
-              </a:rPr>
-              <a:t>e</a:t>
-            </a:r>
-            <a:r>
-              <a:rPr sz="2200" spc="-110" dirty="0">
-                <a:solidFill>
-                  <a:srgbClr val="404040"/>
-                </a:solidFill>
-                <a:latin typeface="Verdana" panose="020B0604030504040204"/>
-                <a:cs typeface="Verdana" panose="020B0604030504040204"/>
-              </a:rPr>
-              <a:t>r</a:t>
-            </a:r>
-            <a:r>
-              <a:rPr sz="2200" spc="-60" dirty="0">
-                <a:solidFill>
-                  <a:srgbClr val="404040"/>
-                </a:solidFill>
-                <a:latin typeface="Verdana" panose="020B0604030504040204"/>
-                <a:cs typeface="Verdana" panose="020B0604030504040204"/>
-              </a:rPr>
-              <a:t>a</a:t>
-            </a:r>
-            <a:r>
-              <a:rPr sz="2200" spc="-15" dirty="0">
-                <a:solidFill>
-                  <a:srgbClr val="404040"/>
-                </a:solidFill>
-                <a:latin typeface="Verdana" panose="020B0604030504040204"/>
-                <a:cs typeface="Verdana" panose="020B0604030504040204"/>
-              </a:rPr>
-              <a:t>t</a:t>
-            </a:r>
-            <a:r>
-              <a:rPr sz="2200" spc="85" dirty="0">
-                <a:solidFill>
-                  <a:srgbClr val="404040"/>
-                </a:solidFill>
-                <a:latin typeface="Verdana" panose="020B0604030504040204"/>
-                <a:cs typeface="Verdana" panose="020B0604030504040204"/>
-              </a:rPr>
-              <a:t>o</a:t>
-            </a:r>
-            <a:r>
-              <a:rPr sz="2200" spc="-55" dirty="0">
-                <a:solidFill>
-                  <a:srgbClr val="404040"/>
-                </a:solidFill>
-                <a:latin typeface="Verdana" panose="020B0604030504040204"/>
-                <a:cs typeface="Verdana" panose="020B0604030504040204"/>
-              </a:rPr>
-              <a:t>r</a:t>
-            </a:r>
-            <a:r>
-              <a:rPr sz="2200" spc="-55" dirty="0">
-                <a:solidFill>
-                  <a:srgbClr val="404040"/>
-                </a:solidFill>
-                <a:latin typeface="Verdana" panose="020B0604030504040204"/>
-                <a:cs typeface="Verdana" panose="020B0604030504040204"/>
-              </a:rPr>
-              <a:t>s</a:t>
+              <a:t>rs</a:t>
             </a:r>
             <a:endParaRPr sz="2200">
               <a:latin typeface="Verdana" panose="020B0604030504040204"/>
@@ -12899,9 +12954,11 @@
         <p:spPr/>
         <p:txBody>
           <a:bodyPr/>
+          <a:lstStyle/>
           <a:p>
             <a:fld id="{B6F15528-21DE-4FAA-801E-634DDDAF4B2B}" type="slidenum">
               <a:rPr/>
+              <a:t>4</a:t>
             </a:fld>
             <a:endParaRPr/>
           </a:p>
@@ -13059,7 +13116,7 @@
               </a:rPr>
               <a:t>{</a:t>
             </a:r>
-            <a:endParaRPr sz="2000">
+            <a:endParaRPr sz="2000" dirty="0">
               <a:latin typeface="Courier New" panose="02070309020205020404"/>
               <a:cs typeface="Courier New" panose="02070309020205020404"/>
             </a:endParaRPr>
@@ -13135,7 +13192,7 @@
               </a:rPr>
               <a:t>:</a:t>
             </a:r>
-            <a:endParaRPr sz="2000">
+            <a:endParaRPr sz="2000" dirty="0">
               <a:latin typeface="Courier New" panose="02070309020205020404"/>
               <a:cs typeface="Courier New" panose="02070309020205020404"/>
             </a:endParaRPr>
@@ -13176,7 +13233,7 @@
               </a:rPr>
               <a:t>break;</a:t>
             </a:r>
-            <a:endParaRPr sz="2000">
+            <a:endParaRPr sz="2000" dirty="0">
               <a:latin typeface="Courier New" panose="02070309020205020404"/>
               <a:cs typeface="Courier New" panose="02070309020205020404"/>
             </a:endParaRPr>
@@ -13230,7 +13287,7 @@
               </a:rPr>
               <a:t>:</a:t>
             </a:r>
-            <a:endParaRPr sz="2000">
+            <a:endParaRPr sz="2000" dirty="0">
               <a:latin typeface="Courier New" panose="02070309020205020404"/>
               <a:cs typeface="Courier New" panose="02070309020205020404"/>
             </a:endParaRPr>
@@ -13271,7 +13328,7 @@
               </a:rPr>
               <a:t>break;</a:t>
             </a:r>
-            <a:endParaRPr sz="2000">
+            <a:endParaRPr sz="2000" dirty="0">
               <a:latin typeface="Courier New" panose="02070309020205020404"/>
               <a:cs typeface="Courier New" panose="02070309020205020404"/>
             </a:endParaRPr>
@@ -13325,7 +13382,7 @@
               </a:rPr>
               <a:t>:</a:t>
             </a:r>
-            <a:endParaRPr sz="2000">
+            <a:endParaRPr sz="2000" dirty="0">
               <a:latin typeface="Courier New" panose="02070309020205020404"/>
               <a:cs typeface="Courier New" panose="02070309020205020404"/>
             </a:endParaRPr>
@@ -13366,7 +13423,7 @@
               </a:rPr>
               <a:t>break;</a:t>
             </a:r>
-            <a:endParaRPr sz="2000">
+            <a:endParaRPr sz="2000" dirty="0">
               <a:latin typeface="Courier New" panose="02070309020205020404"/>
               <a:cs typeface="Courier New" panose="02070309020205020404"/>
             </a:endParaRPr>
@@ -13390,7 +13447,7 @@
               </a:rPr>
               <a:t>}</a:t>
             </a:r>
-            <a:endParaRPr sz="2000">
+            <a:endParaRPr sz="2000" dirty="0">
               <a:latin typeface="Courier New" panose="02070309020205020404"/>
               <a:cs typeface="Courier New" panose="02070309020205020404"/>
             </a:endParaRPr>
@@ -13414,7 +13471,7 @@
               </a:rPr>
               <a:t>}</a:t>
             </a:r>
-            <a:endParaRPr sz="2000">
+            <a:endParaRPr sz="2000" dirty="0">
               <a:latin typeface="Courier New" panose="02070309020205020404"/>
               <a:cs typeface="Courier New" panose="02070309020205020404"/>
             </a:endParaRPr>
@@ -13480,9 +13537,11 @@
         <p:spPr/>
         <p:txBody>
           <a:bodyPr/>
+          <a:lstStyle/>
           <a:p>
             <a:fld id="{B6F15528-21DE-4FAA-801E-634DDDAF4B2B}" type="slidenum">
               <a:rPr/>
+              <a:t>5</a:t>
             </a:fld>
             <a:endParaRPr/>
           </a:p>
@@ -13550,7 +13609,9 @@
         <p:txBody>
           <a:bodyPr wrap="square" lIns="0" tIns="0" rIns="0" bIns="0" rtlCol="0"/>
           <a:lstStyle/>
-          <a:p/>
+          <a:p>
+            <a:endParaRPr/>
+          </a:p>
         </p:txBody>
       </p:sp>
       <p:sp>
@@ -13606,7 +13667,6 @@
               <a:rPr spc="30" dirty="0"/>
               <a:t>ordered</a:t>
             </a:r>
-            <a:endParaRPr spc="30" dirty="0"/>
           </a:p>
         </p:txBody>
       </p:sp>
@@ -14399,37 +14459,17 @@
                 <a:latin typeface="Verdana" panose="020B0604030504040204"/>
                 <a:cs typeface="Verdana" panose="020B0604030504040204"/>
               </a:rPr>
-              <a:t>a</a:t>
-            </a:r>
-            <a:r>
-              <a:rPr sz="3600" spc="-105" dirty="0">
+              <a:t>ar</a:t>
+            </a:r>
+            <a:r>
+              <a:rPr sz="3600" spc="-95" dirty="0">
                 <a:solidFill>
                   <a:srgbClr val="404040"/>
                 </a:solidFill>
                 <a:latin typeface="Verdana" panose="020B0604030504040204"/>
                 <a:cs typeface="Verdana" panose="020B0604030504040204"/>
               </a:rPr>
-              <a:t>r</a:t>
-            </a:r>
-            <a:r>
-              <a:rPr sz="3600" spc="-95" dirty="0">
-                <a:solidFill>
-                  <a:srgbClr val="404040"/>
-                </a:solidFill>
-                <a:latin typeface="Verdana" panose="020B0604030504040204"/>
-                <a:cs typeface="Verdana" panose="020B0604030504040204"/>
-              </a:rPr>
-              <a:t>i</a:t>
-            </a:r>
-            <a:r>
-              <a:rPr sz="3600" spc="-95" dirty="0">
-                <a:solidFill>
-                  <a:srgbClr val="404040"/>
-                </a:solidFill>
-                <a:latin typeface="Verdana" panose="020B0604030504040204"/>
-                <a:cs typeface="Verdana" panose="020B0604030504040204"/>
-              </a:rPr>
-              <a:t>s</a:t>
+              <a:t>is</a:t>
             </a:r>
             <a:r>
               <a:rPr sz="3600" spc="110" dirty="0">
@@ -14481,9 +14521,11 @@
         <p:spPr/>
         <p:txBody>
           <a:bodyPr/>
+          <a:lstStyle/>
           <a:p>
             <a:fld id="{B6F15528-21DE-4FAA-801E-634DDDAF4B2B}" type="slidenum">
               <a:rPr/>
+              <a:t>6</a:t>
             </a:fld>
             <a:endParaRPr/>
           </a:p>
@@ -14614,7 +14656,7 @@
               </a:rPr>
               <a:t>FlightCrewJob.java</a:t>
             </a:r>
-            <a:endParaRPr sz="1800">
+            <a:endParaRPr sz="1800" dirty="0">
               <a:latin typeface="Verdana" panose="020B0604030504040204"/>
               <a:cs typeface="Verdana" panose="020B0604030504040204"/>
             </a:endParaRPr>
@@ -14628,7 +14670,7 @@
                 <a:spcPts val="5"/>
               </a:spcBef>
             </a:pPr>
-            <a:endParaRPr sz="2000">
+            <a:endParaRPr sz="2000" dirty="0">
               <a:latin typeface="Verdana" panose="020B0604030504040204"/>
               <a:cs typeface="Verdana" panose="020B0604030504040204"/>
             </a:endParaRPr>
@@ -14702,7 +14744,7 @@
               </a:rPr>
               <a:t>COPILOT,</a:t>
             </a:r>
-            <a:endParaRPr sz="2000">
+            <a:endParaRPr sz="2000" dirty="0">
               <a:latin typeface="Courier New" panose="02070309020205020404"/>
               <a:cs typeface="Courier New" panose="02070309020205020404"/>
             </a:endParaRPr>
@@ -14726,7 +14768,7 @@
               </a:rPr>
               <a:t>PILOT</a:t>
             </a:r>
-            <a:endParaRPr sz="2000">
+            <a:endParaRPr sz="2000" dirty="0">
               <a:latin typeface="Courier New" panose="02070309020205020404"/>
               <a:cs typeface="Courier New" panose="02070309020205020404"/>
             </a:endParaRPr>
@@ -14750,7 +14792,7 @@
               </a:rPr>
               <a:t>}</a:t>
             </a:r>
-            <a:endParaRPr sz="2000">
+            <a:endParaRPr sz="2000" dirty="0">
               <a:latin typeface="Courier New" panose="02070309020205020404"/>
               <a:cs typeface="Courier New" panose="02070309020205020404"/>
             </a:endParaRPr>
@@ -14790,7 +14832,6 @@
               <a:rPr spc="-30" dirty="0"/>
               <a:t>CrewMember.java</a:t>
             </a:r>
-            <a:endParaRPr spc="-30" dirty="0"/>
           </a:p>
           <a:p>
             <a:pPr>
@@ -15155,9 +15196,11 @@
         <p:spPr/>
         <p:txBody>
           <a:bodyPr/>
+          <a:lstStyle/>
           <a:p>
             <a:fld id="{B6F15528-21DE-4FAA-801E-634DDDAF4B2B}" type="slidenum">
               <a:rPr/>
+              <a:t>7</a:t>
             </a:fld>
             <a:endParaRPr/>
           </a:p>
@@ -15331,7 +15374,7 @@
               </a:rPr>
               <a:t>"Geetha");</a:t>
             </a:r>
-            <a:endParaRPr sz="2000">
+            <a:endParaRPr sz="2000" dirty="0">
               <a:latin typeface="Courier New" panose="02070309020205020404"/>
               <a:cs typeface="Courier New" panose="02070309020205020404"/>
             </a:endParaRPr>
@@ -15452,7 +15495,7 @@
               </a:rPr>
               <a:t>);</a:t>
             </a:r>
-            <a:endParaRPr sz="2000">
+            <a:endParaRPr sz="2000" dirty="0">
               <a:latin typeface="Courier New" panose="02070309020205020404"/>
               <a:cs typeface="Courier New" panose="02070309020205020404"/>
             </a:endParaRPr>
@@ -15598,7 +15641,7 @@
               </a:rPr>
               <a:t>)</a:t>
             </a:r>
-            <a:endParaRPr sz="2000">
+            <a:endParaRPr sz="2000" dirty="0">
               <a:latin typeface="Courier New" panose="02070309020205020404"/>
               <a:cs typeface="Courier New" panose="02070309020205020404"/>
             </a:endParaRPr>
@@ -15713,6 +15756,16 @@
               <a:t> </a:t>
             </a:r>
             <a:r>
+              <a:rPr lang="en-US" sz="2000" spc="-1190" dirty="0">
+                <a:solidFill>
+                  <a:srgbClr val="F05A28"/>
+                </a:solidFill>
+                <a:latin typeface="Courier New" panose="02070309020205020404"/>
+                <a:cs typeface="Courier New" panose="02070309020205020404"/>
+              </a:rPr>
+              <a:t>(   	</a:t>
+            </a:r>
+            <a:r>
               <a:rPr sz="2000" spc="-5" dirty="0">
                 <a:solidFill>
                   <a:srgbClr val="2A9FBC"/>
@@ -15763,16 +15816,16 @@
               <a:t>member2</a:t>
             </a:r>
             <a:r>
-              <a:rPr sz="2000" spc="-5" dirty="0">
-                <a:solidFill>
-                  <a:srgbClr val="F2F2F2"/>
-                </a:solidFill>
-                <a:latin typeface="Courier New" panose="02070309020205020404"/>
-                <a:cs typeface="Courier New" panose="02070309020205020404"/>
-              </a:rPr>
-              <a:t>;</a:t>
-            </a:r>
-            <a:endParaRPr sz="2000">
+              <a:rPr lang="en-US" sz="2000" spc="-5" dirty="0">
+                <a:solidFill>
+                  <a:srgbClr val="9BC850"/>
+                </a:solidFill>
+                <a:latin typeface="Courier New" panose="02070309020205020404"/>
+                <a:cs typeface="Courier New" panose="02070309020205020404"/>
+              </a:rPr>
+              <a:t>);</a:t>
+            </a:r>
+            <a:endParaRPr sz="2000" dirty="0">
               <a:latin typeface="Courier New" panose="02070309020205020404"/>
               <a:cs typeface="Courier New" panose="02070309020205020404"/>
             </a:endParaRPr>
@@ -15956,7 +16009,7 @@
               </a:rPr>
               <a:t>boss</a:t>
             </a:r>
-            <a:endParaRPr sz="2000">
+            <a:endParaRPr sz="2000" dirty="0">
               <a:latin typeface="Courier New" panose="02070309020205020404"/>
               <a:cs typeface="Courier New" panose="02070309020205020404"/>
             </a:endParaRPr>
@@ -15980,7 +16033,7 @@
               </a:rPr>
               <a:t>}</a:t>
             </a:r>
-            <a:endParaRPr sz="2000">
+            <a:endParaRPr sz="2000" dirty="0">
               <a:latin typeface="Courier New" panose="02070309020205020404"/>
               <a:cs typeface="Courier New" panose="02070309020205020404"/>
             </a:endParaRPr>
@@ -16046,9 +16099,11 @@
         <p:spPr/>
         <p:txBody>
           <a:bodyPr/>
+          <a:lstStyle/>
           <a:p>
             <a:fld id="{B6F15528-21DE-4FAA-801E-634DDDAF4B2B}" type="slidenum">
               <a:rPr/>
+              <a:t>8</a:t>
             </a:fld>
             <a:endParaRPr/>
           </a:p>
@@ -16166,7 +16221,7 @@
         </p:nvGraphicFramePr>
         <p:xfrm>
           <a:off x="2019494" y="1855378"/>
-          <a:ext cx="8159750" cy="1750060"/>
+          <a:ext cx="8140700" cy="1737360"/>
         </p:xfrm>
         <a:graphic>
           <a:graphicData uri="http://schemas.openxmlformats.org/drawingml/2006/table">
@@ -16175,8 +16230,20 @@
                 <a:tableStyleId>{2D5ABB26-0587-4C30-8999-92F81FD0307C}</a:tableStyleId>
               </a:tblPr>
               <a:tblGrid>
-                <a:gridCol w="1968500"/>
-                <a:gridCol w="6172200"/>
+                <a:gridCol w="1968500">
+                  <a:extLst>
+                    <a:ext uri="{9D8B030D-6E8A-4147-A177-3AD203B41FA5}">
+                      <a16:colId xmlns:a16="http://schemas.microsoft.com/office/drawing/2014/main" val="20000"/>
+                    </a:ext>
+                  </a:extLst>
+                </a:gridCol>
+                <a:gridCol w="6172200">
+                  <a:extLst>
+                    <a:ext uri="{9D8B030D-6E8A-4147-A177-3AD203B41FA5}">
+                      <a16:colId xmlns:a16="http://schemas.microsoft.com/office/drawing/2014/main" val="20001"/>
+                    </a:ext>
+                  </a:extLst>
+                </a:gridCol>
               </a:tblGrid>
               <a:tr h="457200">
                 <a:tc>
@@ -16297,6 +16364,11 @@
                     </a:solidFill>
                   </a:tcPr>
                 </a:tc>
+                <a:extLst>
+                  <a:ext uri="{0D108BD9-81ED-4DB2-BD59-A6C34878D82A}">
+                    <a16:rowId xmlns:a16="http://schemas.microsoft.com/office/drawing/2014/main" val="10000"/>
+                  </a:ext>
+                </a:extLst>
               </a:tr>
               <a:tr h="457200">
                 <a:tc>
@@ -16517,6 +16589,11 @@
                     </a:solidFill>
                   </a:tcPr>
                 </a:tc>
+                <a:extLst>
+                  <a:ext uri="{0D108BD9-81ED-4DB2-BD59-A6C34878D82A}">
+                    <a16:rowId xmlns:a16="http://schemas.microsoft.com/office/drawing/2014/main" val="10001"/>
+                  </a:ext>
+                </a:extLst>
               </a:tr>
               <a:tr h="822960">
                 <a:tc>
@@ -16817,6 +16894,11 @@
                     </a:solidFill>
                   </a:tcPr>
                 </a:tc>
+                <a:extLst>
+                  <a:ext uri="{0D108BD9-81ED-4DB2-BD59-A6C34878D82A}">
+                    <a16:rowId xmlns:a16="http://schemas.microsoft.com/office/drawing/2014/main" val="10002"/>
+                  </a:ext>
+                </a:extLst>
               </a:tr>
             </a:tbl>
           </a:graphicData>
@@ -16835,9 +16917,11 @@
         <p:spPr/>
         <p:txBody>
           <a:bodyPr/>
+          <a:lstStyle/>
           <a:p>
             <a:fld id="{B6F15528-21DE-4FAA-801E-634DDDAF4B2B}" type="slidenum">
               <a:rPr/>
+              <a:t>9</a:t>
             </a:fld>
             <a:endParaRPr/>
           </a:p>
@@ -17129,6 +17213,8 @@
       </a:bgFillStyleLst>
     </a:fmtScheme>
   </a:themeElements>
+  <a:objectDefaults/>
+  <a:extraClrSchemeLst/>
   <a:extLst>
     <a:ext uri="{05A4C25C-085E-4340-85A3-A5531E510DB2}">
       <thm15:themeFamily xmlns:thm15="http://schemas.microsoft.com/office/thememl/2012/main" name="Office Theme" id="{62F939B6-93AF-4DB8-9C6B-D6C7DFDC589F}" vid="{4A3C46E8-61CC-4603-A589-7422A47A8E4A}"/>
@@ -17388,6 +17474,8 @@
       </a:bgFillStyleLst>
     </a:fmtScheme>
   </a:themeElements>
+  <a:objectDefaults/>
+  <a:extraClrSchemeLst/>
   <a:extLst>
     <a:ext uri="{05A4C25C-085E-4340-85A3-A5531E510DB2}">
       <thm15:themeFamily xmlns:thm15="http://schemas.microsoft.com/office/thememl/2012/main" name="Office Theme" id="{62F939B6-93AF-4DB8-9C6B-D6C7DFDC589F}" vid="{4A3C46E8-61CC-4603-A589-7422A47A8E4A}"/>

</xml_diff>